<commit_message>
pptx updates and pruning old scripts
</commit_message>
<xml_diff>
--- a/pptx/rvm_salamander_gsh_analyses.pptx
+++ b/pptx/rvm_salamander_gsh_analyses.pptx
@@ -8,13 +8,15 @@
     <p:sldId id="259" r:id="rId2"/>
     <p:sldId id="257" r:id="rId3"/>
     <p:sldId id="258" r:id="rId4"/>
-    <p:sldId id="260" r:id="rId5"/>
-    <p:sldId id="261" r:id="rId6"/>
-    <p:sldId id="262" r:id="rId7"/>
-    <p:sldId id="263" r:id="rId8"/>
-    <p:sldId id="264" r:id="rId9"/>
-    <p:sldId id="265" r:id="rId10"/>
-    <p:sldId id="266" r:id="rId11"/>
+    <p:sldId id="267" r:id="rId5"/>
+    <p:sldId id="260" r:id="rId6"/>
+    <p:sldId id="261" r:id="rId7"/>
+    <p:sldId id="262" r:id="rId8"/>
+    <p:sldId id="263" r:id="rId9"/>
+    <p:sldId id="264" r:id="rId10"/>
+    <p:sldId id="265" r:id="rId11"/>
+    <p:sldId id="266" r:id="rId12"/>
+    <p:sldId id="268" r:id="rId13"/>
   </p:sldIdLst>
   <p:sldSz cx="12192000" cy="6858000"/>
   <p:notesSz cx="6858000" cy="9144000"/>
@@ -113,6 +115,11 @@
       </a:defRPr>
     </a:lvl9pPr>
   </p:defaultTextStyle>
+  <p:extLst>
+    <p:ext uri="{EFAFB233-063F-42B5-8137-9DF3F51BA10A}">
+      <p15:sldGuideLst xmlns:p15="http://schemas.microsoft.com/office/powerpoint/2012/main"/>
+    </p:ext>
+  </p:extLst>
 </p:presentation>
 </file>
 
@@ -263,7 +270,7 @@
           <a:p>
             <a:fld id="{625A6AA8-F020-423B-A49D-E590DC0EE0D9}" type="datetimeFigureOut">
               <a:rPr lang="en-US" smtClean="0"/>
-              <a:t>4/30/2021</a:t>
+              <a:t>9/11/2022</a:t>
             </a:fld>
             <a:endParaRPr lang="en-US"/>
           </a:p>
@@ -461,7 +468,7 @@
           <a:p>
             <a:fld id="{625A6AA8-F020-423B-A49D-E590DC0EE0D9}" type="datetimeFigureOut">
               <a:rPr lang="en-US" smtClean="0"/>
-              <a:t>4/30/2021</a:t>
+              <a:t>9/11/2022</a:t>
             </a:fld>
             <a:endParaRPr lang="en-US"/>
           </a:p>
@@ -669,7 +676,7 @@
           <a:p>
             <a:fld id="{625A6AA8-F020-423B-A49D-E590DC0EE0D9}" type="datetimeFigureOut">
               <a:rPr lang="en-US" smtClean="0"/>
-              <a:t>4/30/2021</a:t>
+              <a:t>9/11/2022</a:t>
             </a:fld>
             <a:endParaRPr lang="en-US"/>
           </a:p>
@@ -867,7 +874,7 @@
           <a:p>
             <a:fld id="{625A6AA8-F020-423B-A49D-E590DC0EE0D9}" type="datetimeFigureOut">
               <a:rPr lang="en-US" smtClean="0"/>
-              <a:t>4/30/2021</a:t>
+              <a:t>9/11/2022</a:t>
             </a:fld>
             <a:endParaRPr lang="en-US"/>
           </a:p>
@@ -1142,7 +1149,7 @@
           <a:p>
             <a:fld id="{625A6AA8-F020-423B-A49D-E590DC0EE0D9}" type="datetimeFigureOut">
               <a:rPr lang="en-US" smtClean="0"/>
-              <a:t>4/30/2021</a:t>
+              <a:t>9/11/2022</a:t>
             </a:fld>
             <a:endParaRPr lang="en-US"/>
           </a:p>
@@ -1407,7 +1414,7 @@
           <a:p>
             <a:fld id="{625A6AA8-F020-423B-A49D-E590DC0EE0D9}" type="datetimeFigureOut">
               <a:rPr lang="en-US" smtClean="0"/>
-              <a:t>4/30/2021</a:t>
+              <a:t>9/11/2022</a:t>
             </a:fld>
             <a:endParaRPr lang="en-US"/>
           </a:p>
@@ -1819,7 +1826,7 @@
           <a:p>
             <a:fld id="{625A6AA8-F020-423B-A49D-E590DC0EE0D9}" type="datetimeFigureOut">
               <a:rPr lang="en-US" smtClean="0"/>
-              <a:t>4/30/2021</a:t>
+              <a:t>9/11/2022</a:t>
             </a:fld>
             <a:endParaRPr lang="en-US"/>
           </a:p>
@@ -1960,7 +1967,7 @@
           <a:p>
             <a:fld id="{625A6AA8-F020-423B-A49D-E590DC0EE0D9}" type="datetimeFigureOut">
               <a:rPr lang="en-US" smtClean="0"/>
-              <a:t>4/30/2021</a:t>
+              <a:t>9/11/2022</a:t>
             </a:fld>
             <a:endParaRPr lang="en-US"/>
           </a:p>
@@ -2073,7 +2080,7 @@
           <a:p>
             <a:fld id="{625A6AA8-F020-423B-A49D-E590DC0EE0D9}" type="datetimeFigureOut">
               <a:rPr lang="en-US" smtClean="0"/>
-              <a:t>4/30/2021</a:t>
+              <a:t>9/11/2022</a:t>
             </a:fld>
             <a:endParaRPr lang="en-US"/>
           </a:p>
@@ -2384,7 +2391,7 @@
           <a:p>
             <a:fld id="{625A6AA8-F020-423B-A49D-E590DC0EE0D9}" type="datetimeFigureOut">
               <a:rPr lang="en-US" smtClean="0"/>
-              <a:t>4/30/2021</a:t>
+              <a:t>9/11/2022</a:t>
             </a:fld>
             <a:endParaRPr lang="en-US"/>
           </a:p>
@@ -2672,7 +2679,7 @@
           <a:p>
             <a:fld id="{625A6AA8-F020-423B-A49D-E590DC0EE0D9}" type="datetimeFigureOut">
               <a:rPr lang="en-US" smtClean="0"/>
-              <a:t>4/30/2021</a:t>
+              <a:t>9/11/2022</a:t>
             </a:fld>
             <a:endParaRPr lang="en-US"/>
           </a:p>
@@ -2913,7 +2920,7 @@
           <a:p>
             <a:fld id="{625A6AA8-F020-423B-A49D-E590DC0EE0D9}" type="datetimeFigureOut">
               <a:rPr lang="en-US" smtClean="0"/>
-              <a:t>4/30/2021</a:t>
+              <a:t>9/11/2022</a:t>
             </a:fld>
             <a:endParaRPr lang="en-US"/>
           </a:p>
@@ -3392,10 +3399,10 @@
       </p:grpSpPr>
       <p:pic>
         <p:nvPicPr>
-          <p:cNvPr id="2" name="Picture 1">
-            <a:extLst>
-              <a:ext uri="{FF2B5EF4-FFF2-40B4-BE49-F238E27FC236}">
-                <a16:creationId xmlns:a16="http://schemas.microsoft.com/office/drawing/2014/main" id="{0F6FE74F-2E99-4965-B64D-5EB00AFE9214}"/>
+          <p:cNvPr id="7" name="Picture 6">
+            <a:extLst>
+              <a:ext uri="{FF2B5EF4-FFF2-40B4-BE49-F238E27FC236}">
+                <a16:creationId xmlns:a16="http://schemas.microsoft.com/office/drawing/2014/main" id="{FCD14FDF-BB33-479C-872C-4AEC126E0EB1}"/>
               </a:ext>
             </a:extLst>
           </p:cNvPr>
@@ -3412,8 +3419,8 @@
         </p:blipFill>
         <p:spPr>
           <a:xfrm>
-            <a:off x="0" y="-342"/>
-            <a:ext cx="9256008" cy="3733429"/>
+            <a:off x="0" y="0"/>
+            <a:ext cx="9814574" cy="3702570"/>
           </a:xfrm>
           <a:prstGeom prst="rect">
             <a:avLst/>
@@ -3422,10 +3429,10 @@
       </p:pic>
       <p:pic>
         <p:nvPicPr>
-          <p:cNvPr id="3" name="Picture 2">
-            <a:extLst>
-              <a:ext uri="{FF2B5EF4-FFF2-40B4-BE49-F238E27FC236}">
-                <a16:creationId xmlns:a16="http://schemas.microsoft.com/office/drawing/2014/main" id="{4DFB893D-972E-4DE1-B699-1956257397CC}"/>
+          <p:cNvPr id="8" name="Picture 7">
+            <a:extLst>
+              <a:ext uri="{FF2B5EF4-FFF2-40B4-BE49-F238E27FC236}">
+                <a16:creationId xmlns:a16="http://schemas.microsoft.com/office/drawing/2014/main" id="{C09A266D-1154-43AA-8598-5C968F37CC76}"/>
               </a:ext>
             </a:extLst>
           </p:cNvPr>
@@ -3442,8 +3449,8 @@
         </p:blipFill>
         <p:spPr>
           <a:xfrm>
-            <a:off x="2598329" y="3233614"/>
-            <a:ext cx="9593671" cy="3631503"/>
+            <a:off x="2749191" y="3278786"/>
+            <a:ext cx="9442809" cy="3579214"/>
           </a:xfrm>
           <a:prstGeom prst="rect">
             <a:avLst/>
@@ -3465,7 +3472,7 @@
         <p:spPr>
           <a:xfrm>
             <a:off x="9814573" y="149902"/>
-            <a:ext cx="1514487" cy="646331"/>
+            <a:ext cx="1128247" cy="646331"/>
           </a:xfrm>
           <a:prstGeom prst="rect">
             <a:avLst/>
@@ -3486,7 +3493,7 @@
           <a:p>
             <a:r>
               <a:rPr lang="en-US" dirty="0"/>
-              <a:t>chlorpyrifos</a:t>
+              <a:t>24d</a:t>
             </a:r>
           </a:p>
         </p:txBody>
@@ -3505,8 +3512,8 @@
         </p:nvSpPr>
         <p:spPr>
           <a:xfrm>
-            <a:off x="1092531" y="5978124"/>
-            <a:ext cx="1505798" cy="646331"/>
+            <a:off x="1470081" y="5978124"/>
+            <a:ext cx="1128247" cy="646331"/>
           </a:xfrm>
           <a:prstGeom prst="rect">
             <a:avLst/>
@@ -3527,7 +3534,7 @@
           <a:p>
             <a:r>
               <a:rPr lang="en-US" dirty="0"/>
-              <a:t>chlorpyrifos</a:t>
+              <a:t>24d</a:t>
             </a:r>
           </a:p>
         </p:txBody>
@@ -3546,7 +3553,7 @@
         </p:nvSpPr>
         <p:spPr>
           <a:xfrm>
-            <a:off x="0" y="1717297"/>
+            <a:off x="0" y="1815659"/>
             <a:ext cx="1947553" cy="298149"/>
           </a:xfrm>
           <a:prstGeom prst="rect">
@@ -3583,7 +3590,7 @@
         </p:nvSpPr>
         <p:spPr>
           <a:xfrm>
-            <a:off x="2620377" y="6553912"/>
+            <a:off x="2751002" y="6553912"/>
             <a:ext cx="1947553" cy="298149"/>
           </a:xfrm>
           <a:prstGeom prst="rect">
@@ -3620,7 +3627,7 @@
         </p:nvSpPr>
         <p:spPr>
           <a:xfrm>
-            <a:off x="2656003" y="4815885"/>
+            <a:off x="2774753" y="4982135"/>
             <a:ext cx="1947553" cy="298149"/>
           </a:xfrm>
           <a:prstGeom prst="rect">
@@ -3657,7 +3664,7 @@
         </p:nvSpPr>
         <p:spPr>
           <a:xfrm>
-            <a:off x="0" y="3382115"/>
+            <a:off x="0" y="3434938"/>
             <a:ext cx="1947553" cy="298149"/>
           </a:xfrm>
           <a:prstGeom prst="rect">
@@ -3694,7 +3701,7 @@
         </p:nvSpPr>
         <p:spPr>
           <a:xfrm>
-            <a:off x="4845450" y="5610745"/>
+            <a:off x="4845450" y="5586995"/>
             <a:ext cx="1947553" cy="298149"/>
           </a:xfrm>
           <a:prstGeom prst="rect">
@@ -3731,7 +3738,7 @@
         </p:nvSpPr>
         <p:spPr>
           <a:xfrm>
-            <a:off x="4845451" y="3857171"/>
+            <a:off x="4845451" y="4047171"/>
             <a:ext cx="1947553" cy="298149"/>
           </a:xfrm>
           <a:prstGeom prst="rect">
@@ -3843,7 +3850,7 @@
         <p:spPr>
           <a:xfrm>
             <a:off x="53493" y="4079955"/>
-            <a:ext cx="2749191" cy="923330"/>
+            <a:ext cx="2749191" cy="1200329"/>
           </a:xfrm>
           <a:prstGeom prst="rect">
             <a:avLst/>
@@ -3858,6 +3865,517 @@
           <a:p>
             <a:r>
               <a:rPr lang="en-US" dirty="0"/>
+              <a:t>24d exposure results in significant </a:t>
+            </a:r>
+            <a:r>
+              <a:rPr lang="en-US" dirty="0" err="1"/>
+              <a:t>gsh</a:t>
+            </a:r>
+            <a:r>
+              <a:rPr lang="en-US" dirty="0"/>
+              <a:t> elevation (when outliers are dropped)</a:t>
+            </a:r>
+          </a:p>
+        </p:txBody>
+      </p:sp>
+    </p:spTree>
+    <p:extLst>
+      <p:ext uri="{BB962C8B-B14F-4D97-AF65-F5344CB8AC3E}">
+        <p14:creationId xmlns:p14="http://schemas.microsoft.com/office/powerpoint/2010/main" val="1444396804"/>
+      </p:ext>
+    </p:extLst>
+  </p:cSld>
+  <p:clrMapOvr>
+    <a:masterClrMapping/>
+  </p:clrMapOvr>
+</p:sld>
+</file>
+
+<file path=ppt/slides/slide11.xml><?xml version="1.0" encoding="utf-8"?>
+<p:sld xmlns:a="http://schemas.openxmlformats.org/drawingml/2006/main" xmlns:r="http://schemas.openxmlformats.org/officeDocument/2006/relationships" xmlns:p="http://schemas.openxmlformats.org/presentationml/2006/main">
+  <p:cSld>
+    <p:spTree>
+      <p:nvGrpSpPr>
+        <p:cNvPr id="1" name=""/>
+        <p:cNvGrpSpPr/>
+        <p:nvPr/>
+      </p:nvGrpSpPr>
+      <p:grpSpPr>
+        <a:xfrm>
+          <a:off x="0" y="0"/>
+          <a:ext cx="0" cy="0"/>
+          <a:chOff x="0" y="0"/>
+          <a:chExt cx="0" cy="0"/>
+        </a:xfrm>
+      </p:grpSpPr>
+      <p:pic>
+        <p:nvPicPr>
+          <p:cNvPr id="2" name="Picture 1">
+            <a:extLst>
+              <a:ext uri="{FF2B5EF4-FFF2-40B4-BE49-F238E27FC236}">
+                <a16:creationId xmlns:a16="http://schemas.microsoft.com/office/drawing/2014/main" id="{0F6FE74F-2E99-4965-B64D-5EB00AFE9214}"/>
+              </a:ext>
+            </a:extLst>
+          </p:cNvPr>
+          <p:cNvPicPr>
+            <a:picLocks noChangeAspect="1"/>
+          </p:cNvPicPr>
+          <p:nvPr/>
+        </p:nvPicPr>
+        <p:blipFill>
+          <a:blip r:embed="rId2"/>
+          <a:stretch>
+            <a:fillRect/>
+          </a:stretch>
+        </p:blipFill>
+        <p:spPr>
+          <a:xfrm>
+            <a:off x="0" y="-342"/>
+            <a:ext cx="9256008" cy="3733429"/>
+          </a:xfrm>
+          <a:prstGeom prst="rect">
+            <a:avLst/>
+          </a:prstGeom>
+        </p:spPr>
+      </p:pic>
+      <p:pic>
+        <p:nvPicPr>
+          <p:cNvPr id="3" name="Picture 2">
+            <a:extLst>
+              <a:ext uri="{FF2B5EF4-FFF2-40B4-BE49-F238E27FC236}">
+                <a16:creationId xmlns:a16="http://schemas.microsoft.com/office/drawing/2014/main" id="{4DFB893D-972E-4DE1-B699-1956257397CC}"/>
+              </a:ext>
+            </a:extLst>
+          </p:cNvPr>
+          <p:cNvPicPr>
+            <a:picLocks noChangeAspect="1"/>
+          </p:cNvPicPr>
+          <p:nvPr/>
+        </p:nvPicPr>
+        <p:blipFill>
+          <a:blip r:embed="rId3"/>
+          <a:stretch>
+            <a:fillRect/>
+          </a:stretch>
+        </p:blipFill>
+        <p:spPr>
+          <a:xfrm>
+            <a:off x="2598329" y="3233614"/>
+            <a:ext cx="9593671" cy="3631503"/>
+          </a:xfrm>
+          <a:prstGeom prst="rect">
+            <a:avLst/>
+          </a:prstGeom>
+        </p:spPr>
+      </p:pic>
+      <p:sp>
+        <p:nvSpPr>
+          <p:cNvPr id="9" name="TextBox 8">
+            <a:extLst>
+              <a:ext uri="{FF2B5EF4-FFF2-40B4-BE49-F238E27FC236}">
+                <a16:creationId xmlns:a16="http://schemas.microsoft.com/office/drawing/2014/main" id="{BC07244D-294C-4D5B-8815-71CD060CA95A}"/>
+              </a:ext>
+            </a:extLst>
+          </p:cNvPr>
+          <p:cNvSpPr txBox="1"/>
+          <p:nvPr/>
+        </p:nvSpPr>
+        <p:spPr>
+          <a:xfrm>
+            <a:off x="9814573" y="149902"/>
+            <a:ext cx="1514487" cy="646331"/>
+          </a:xfrm>
+          <a:prstGeom prst="rect">
+            <a:avLst/>
+          </a:prstGeom>
+          <a:noFill/>
+        </p:spPr>
+        <p:txBody>
+          <a:bodyPr wrap="square" rtlCol="0">
+            <a:spAutoFit/>
+          </a:bodyPr>
+          <a:lstStyle/>
+          <a:p>
+            <a:r>
+              <a:rPr lang="en-US" dirty="0"/>
+              <a:t>1:5</a:t>
+            </a:r>
+          </a:p>
+          <a:p>
+            <a:r>
+              <a:rPr lang="en-US" dirty="0"/>
+              <a:t>chlorpyrifos</a:t>
+            </a:r>
+          </a:p>
+        </p:txBody>
+      </p:sp>
+      <p:sp>
+        <p:nvSpPr>
+          <p:cNvPr id="10" name="TextBox 9">
+            <a:extLst>
+              <a:ext uri="{FF2B5EF4-FFF2-40B4-BE49-F238E27FC236}">
+                <a16:creationId xmlns:a16="http://schemas.microsoft.com/office/drawing/2014/main" id="{1871EB22-F10A-4181-8810-3A258E8063BC}"/>
+              </a:ext>
+            </a:extLst>
+          </p:cNvPr>
+          <p:cNvSpPr txBox="1"/>
+          <p:nvPr/>
+        </p:nvSpPr>
+        <p:spPr>
+          <a:xfrm>
+            <a:off x="1092531" y="5978124"/>
+            <a:ext cx="1505798" cy="646331"/>
+          </a:xfrm>
+          <a:prstGeom prst="rect">
+            <a:avLst/>
+          </a:prstGeom>
+          <a:noFill/>
+        </p:spPr>
+        <p:txBody>
+          <a:bodyPr wrap="square" rtlCol="0">
+            <a:spAutoFit/>
+          </a:bodyPr>
+          <a:lstStyle/>
+          <a:p>
+            <a:r>
+              <a:rPr lang="en-US" dirty="0"/>
+              <a:t>1:8</a:t>
+            </a:r>
+          </a:p>
+          <a:p>
+            <a:r>
+              <a:rPr lang="en-US" dirty="0"/>
+              <a:t>chlorpyrifos</a:t>
+            </a:r>
+          </a:p>
+        </p:txBody>
+      </p:sp>
+      <p:sp>
+        <p:nvSpPr>
+          <p:cNvPr id="11" name="TextBox 10">
+            <a:extLst>
+              <a:ext uri="{FF2B5EF4-FFF2-40B4-BE49-F238E27FC236}">
+                <a16:creationId xmlns:a16="http://schemas.microsoft.com/office/drawing/2014/main" id="{963B7C31-AB2D-48FA-BB75-287961F1FBCB}"/>
+              </a:ext>
+            </a:extLst>
+          </p:cNvPr>
+          <p:cNvSpPr txBox="1"/>
+          <p:nvPr/>
+        </p:nvSpPr>
+        <p:spPr>
+          <a:xfrm>
+            <a:off x="0" y="1717297"/>
+            <a:ext cx="1947553" cy="298149"/>
+          </a:xfrm>
+          <a:prstGeom prst="rect">
+            <a:avLst/>
+          </a:prstGeom>
+          <a:noFill/>
+          <a:ln w="38100">
+            <a:solidFill>
+              <a:srgbClr val="FF0000"/>
+            </a:solidFill>
+          </a:ln>
+        </p:spPr>
+        <p:txBody>
+          <a:bodyPr wrap="square" rtlCol="0">
+            <a:spAutoFit/>
+          </a:bodyPr>
+          <a:lstStyle/>
+          <a:p>
+            <a:endParaRPr lang="en-US" dirty="0"/>
+          </a:p>
+        </p:txBody>
+      </p:sp>
+      <p:sp>
+        <p:nvSpPr>
+          <p:cNvPr id="12" name="TextBox 11">
+            <a:extLst>
+              <a:ext uri="{FF2B5EF4-FFF2-40B4-BE49-F238E27FC236}">
+                <a16:creationId xmlns:a16="http://schemas.microsoft.com/office/drawing/2014/main" id="{544525F6-A5AE-477F-A613-D1CF6CD08E88}"/>
+              </a:ext>
+            </a:extLst>
+          </p:cNvPr>
+          <p:cNvSpPr txBox="1"/>
+          <p:nvPr/>
+        </p:nvSpPr>
+        <p:spPr>
+          <a:xfrm>
+            <a:off x="2620377" y="6553912"/>
+            <a:ext cx="1947553" cy="298149"/>
+          </a:xfrm>
+          <a:prstGeom prst="rect">
+            <a:avLst/>
+          </a:prstGeom>
+          <a:noFill/>
+          <a:ln w="38100">
+            <a:solidFill>
+              <a:srgbClr val="FF0000"/>
+            </a:solidFill>
+          </a:ln>
+        </p:spPr>
+        <p:txBody>
+          <a:bodyPr wrap="square" rtlCol="0">
+            <a:spAutoFit/>
+          </a:bodyPr>
+          <a:lstStyle/>
+          <a:p>
+            <a:endParaRPr lang="en-US" dirty="0"/>
+          </a:p>
+        </p:txBody>
+      </p:sp>
+      <p:sp>
+        <p:nvSpPr>
+          <p:cNvPr id="13" name="TextBox 12">
+            <a:extLst>
+              <a:ext uri="{FF2B5EF4-FFF2-40B4-BE49-F238E27FC236}">
+                <a16:creationId xmlns:a16="http://schemas.microsoft.com/office/drawing/2014/main" id="{C25BD4F0-EF30-4B5C-9689-F58B5C3F6822}"/>
+              </a:ext>
+            </a:extLst>
+          </p:cNvPr>
+          <p:cNvSpPr txBox="1"/>
+          <p:nvPr/>
+        </p:nvSpPr>
+        <p:spPr>
+          <a:xfrm>
+            <a:off x="2656003" y="4815885"/>
+            <a:ext cx="1947553" cy="298149"/>
+          </a:xfrm>
+          <a:prstGeom prst="rect">
+            <a:avLst/>
+          </a:prstGeom>
+          <a:noFill/>
+          <a:ln w="38100">
+            <a:solidFill>
+              <a:srgbClr val="FF0000"/>
+            </a:solidFill>
+          </a:ln>
+        </p:spPr>
+        <p:txBody>
+          <a:bodyPr wrap="square" rtlCol="0">
+            <a:spAutoFit/>
+          </a:bodyPr>
+          <a:lstStyle/>
+          <a:p>
+            <a:endParaRPr lang="en-US" dirty="0"/>
+          </a:p>
+        </p:txBody>
+      </p:sp>
+      <p:sp>
+        <p:nvSpPr>
+          <p:cNvPr id="14" name="TextBox 13">
+            <a:extLst>
+              <a:ext uri="{FF2B5EF4-FFF2-40B4-BE49-F238E27FC236}">
+                <a16:creationId xmlns:a16="http://schemas.microsoft.com/office/drawing/2014/main" id="{2E10BCBE-9D39-4E31-B7A6-748D3F9848F3}"/>
+              </a:ext>
+            </a:extLst>
+          </p:cNvPr>
+          <p:cNvSpPr txBox="1"/>
+          <p:nvPr/>
+        </p:nvSpPr>
+        <p:spPr>
+          <a:xfrm>
+            <a:off x="0" y="3382115"/>
+            <a:ext cx="1947553" cy="298149"/>
+          </a:xfrm>
+          <a:prstGeom prst="rect">
+            <a:avLst/>
+          </a:prstGeom>
+          <a:noFill/>
+          <a:ln w="38100">
+            <a:solidFill>
+              <a:srgbClr val="FF0000"/>
+            </a:solidFill>
+          </a:ln>
+        </p:spPr>
+        <p:txBody>
+          <a:bodyPr wrap="square" rtlCol="0">
+            <a:spAutoFit/>
+          </a:bodyPr>
+          <a:lstStyle/>
+          <a:p>
+            <a:endParaRPr lang="en-US" dirty="0"/>
+          </a:p>
+        </p:txBody>
+      </p:sp>
+      <p:sp>
+        <p:nvSpPr>
+          <p:cNvPr id="15" name="TextBox 14">
+            <a:extLst>
+              <a:ext uri="{FF2B5EF4-FFF2-40B4-BE49-F238E27FC236}">
+                <a16:creationId xmlns:a16="http://schemas.microsoft.com/office/drawing/2014/main" id="{1E05821F-7C52-4BD8-B766-EBE0DCA992D6}"/>
+              </a:ext>
+            </a:extLst>
+          </p:cNvPr>
+          <p:cNvSpPr txBox="1"/>
+          <p:nvPr/>
+        </p:nvSpPr>
+        <p:spPr>
+          <a:xfrm>
+            <a:off x="4845450" y="5610745"/>
+            <a:ext cx="1947553" cy="298149"/>
+          </a:xfrm>
+          <a:prstGeom prst="rect">
+            <a:avLst/>
+          </a:prstGeom>
+          <a:noFill/>
+          <a:ln w="38100">
+            <a:solidFill>
+              <a:srgbClr val="FF0000"/>
+            </a:solidFill>
+          </a:ln>
+        </p:spPr>
+        <p:txBody>
+          <a:bodyPr wrap="square" rtlCol="0">
+            <a:spAutoFit/>
+          </a:bodyPr>
+          <a:lstStyle/>
+          <a:p>
+            <a:endParaRPr lang="en-US" dirty="0"/>
+          </a:p>
+        </p:txBody>
+      </p:sp>
+      <p:sp>
+        <p:nvSpPr>
+          <p:cNvPr id="16" name="TextBox 15">
+            <a:extLst>
+              <a:ext uri="{FF2B5EF4-FFF2-40B4-BE49-F238E27FC236}">
+                <a16:creationId xmlns:a16="http://schemas.microsoft.com/office/drawing/2014/main" id="{EBAE140D-EBD1-4737-8B46-7F65C5547E5C}"/>
+              </a:ext>
+            </a:extLst>
+          </p:cNvPr>
+          <p:cNvSpPr txBox="1"/>
+          <p:nvPr/>
+        </p:nvSpPr>
+        <p:spPr>
+          <a:xfrm>
+            <a:off x="4845451" y="3857171"/>
+            <a:ext cx="1947553" cy="298149"/>
+          </a:xfrm>
+          <a:prstGeom prst="rect">
+            <a:avLst/>
+          </a:prstGeom>
+          <a:noFill/>
+          <a:ln w="38100">
+            <a:solidFill>
+              <a:srgbClr val="FF0000"/>
+            </a:solidFill>
+          </a:ln>
+        </p:spPr>
+        <p:txBody>
+          <a:bodyPr wrap="square" rtlCol="0">
+            <a:spAutoFit/>
+          </a:bodyPr>
+          <a:lstStyle/>
+          <a:p>
+            <a:endParaRPr lang="en-US" dirty="0"/>
+          </a:p>
+        </p:txBody>
+      </p:sp>
+      <p:sp>
+        <p:nvSpPr>
+          <p:cNvPr id="17" name="TextBox 16">
+            <a:extLst>
+              <a:ext uri="{FF2B5EF4-FFF2-40B4-BE49-F238E27FC236}">
+                <a16:creationId xmlns:a16="http://schemas.microsoft.com/office/drawing/2014/main" id="{195405B6-3963-4589-BA90-2EB76593C921}"/>
+              </a:ext>
+            </a:extLst>
+          </p:cNvPr>
+          <p:cNvSpPr txBox="1"/>
+          <p:nvPr/>
+        </p:nvSpPr>
+        <p:spPr>
+          <a:xfrm>
+            <a:off x="2252353" y="2436421"/>
+            <a:ext cx="1947553" cy="298149"/>
+          </a:xfrm>
+          <a:prstGeom prst="rect">
+            <a:avLst/>
+          </a:prstGeom>
+          <a:noFill/>
+          <a:ln w="38100">
+            <a:solidFill>
+              <a:srgbClr val="FF0000"/>
+            </a:solidFill>
+          </a:ln>
+        </p:spPr>
+        <p:txBody>
+          <a:bodyPr wrap="square" rtlCol="0">
+            <a:spAutoFit/>
+          </a:bodyPr>
+          <a:lstStyle/>
+          <a:p>
+            <a:endParaRPr lang="en-US" dirty="0"/>
+          </a:p>
+        </p:txBody>
+      </p:sp>
+      <p:sp>
+        <p:nvSpPr>
+          <p:cNvPr id="18" name="TextBox 17">
+            <a:extLst>
+              <a:ext uri="{FF2B5EF4-FFF2-40B4-BE49-F238E27FC236}">
+                <a16:creationId xmlns:a16="http://schemas.microsoft.com/office/drawing/2014/main" id="{E8AE9FBD-946E-4CFE-9BB3-DF300E8A1803}"/>
+              </a:ext>
+            </a:extLst>
+          </p:cNvPr>
+          <p:cNvSpPr txBox="1"/>
+          <p:nvPr/>
+        </p:nvSpPr>
+        <p:spPr>
+          <a:xfrm>
+            <a:off x="2252353" y="798063"/>
+            <a:ext cx="1947553" cy="298149"/>
+          </a:xfrm>
+          <a:prstGeom prst="rect">
+            <a:avLst/>
+          </a:prstGeom>
+          <a:noFill/>
+          <a:ln w="38100">
+            <a:solidFill>
+              <a:srgbClr val="FF0000"/>
+            </a:solidFill>
+          </a:ln>
+        </p:spPr>
+        <p:txBody>
+          <a:bodyPr wrap="square" rtlCol="0">
+            <a:spAutoFit/>
+          </a:bodyPr>
+          <a:lstStyle/>
+          <a:p>
+            <a:endParaRPr lang="en-US" dirty="0"/>
+          </a:p>
+        </p:txBody>
+      </p:sp>
+      <p:sp>
+        <p:nvSpPr>
+          <p:cNvPr id="19" name="TextBox 18">
+            <a:extLst>
+              <a:ext uri="{FF2B5EF4-FFF2-40B4-BE49-F238E27FC236}">
+                <a16:creationId xmlns:a16="http://schemas.microsoft.com/office/drawing/2014/main" id="{68BD1286-4EAD-4046-886C-B3242A7ECCC5}"/>
+              </a:ext>
+            </a:extLst>
+          </p:cNvPr>
+          <p:cNvSpPr txBox="1"/>
+          <p:nvPr/>
+        </p:nvSpPr>
+        <p:spPr>
+          <a:xfrm>
+            <a:off x="53493" y="4079955"/>
+            <a:ext cx="2749191" cy="923330"/>
+          </a:xfrm>
+          <a:prstGeom prst="rect">
+            <a:avLst/>
+          </a:prstGeom>
+          <a:noFill/>
+        </p:spPr>
+        <p:txBody>
+          <a:bodyPr wrap="square" rtlCol="0">
+            <a:spAutoFit/>
+          </a:bodyPr>
+          <a:lstStyle/>
+          <a:p>
+            <a:r>
+              <a:rPr lang="en-US" dirty="0"/>
               <a:t>chlorpyrifos exposure results in insignificant </a:t>
             </a:r>
             <a:r>
@@ -3875,6 +4393,89 @@
     <p:extLst>
       <p:ext uri="{BB962C8B-B14F-4D97-AF65-F5344CB8AC3E}">
         <p14:creationId xmlns:p14="http://schemas.microsoft.com/office/powerpoint/2010/main" val="1056058616"/>
+      </p:ext>
+    </p:extLst>
+  </p:cSld>
+  <p:clrMapOvr>
+    <a:masterClrMapping/>
+  </p:clrMapOvr>
+</p:sld>
+</file>
+
+<file path=ppt/slides/slide12.xml><?xml version="1.0" encoding="utf-8"?>
+<p:sld xmlns:a="http://schemas.openxmlformats.org/drawingml/2006/main" xmlns:r="http://schemas.openxmlformats.org/officeDocument/2006/relationships" xmlns:p="http://schemas.openxmlformats.org/presentationml/2006/main">
+  <p:cSld>
+    <p:spTree>
+      <p:nvGrpSpPr>
+        <p:cNvPr id="1" name=""/>
+        <p:cNvGrpSpPr/>
+        <p:nvPr/>
+      </p:nvGrpSpPr>
+      <p:grpSpPr>
+        <a:xfrm>
+          <a:off x="0" y="0"/>
+          <a:ext cx="0" cy="0"/>
+          <a:chOff x="0" y="0"/>
+          <a:chExt cx="0" cy="0"/>
+        </a:xfrm>
+      </p:grpSpPr>
+      <p:sp>
+        <p:nvSpPr>
+          <p:cNvPr id="2" name="Title 1">
+            <a:extLst>
+              <a:ext uri="{FF2B5EF4-FFF2-40B4-BE49-F238E27FC236}">
+                <a16:creationId xmlns:a16="http://schemas.microsoft.com/office/drawing/2014/main" id="{C98E6559-2A37-4785-B9C3-9F9EF4E9EBE3}"/>
+              </a:ext>
+            </a:extLst>
+          </p:cNvPr>
+          <p:cNvSpPr>
+            <a:spLocks noGrp="1"/>
+          </p:cNvSpPr>
+          <p:nvPr>
+            <p:ph type="title"/>
+          </p:nvPr>
+        </p:nvSpPr>
+        <p:spPr/>
+        <p:txBody>
+          <a:bodyPr/>
+          <a:lstStyle/>
+          <a:p>
+            <a:r>
+              <a:rPr lang="en-US" dirty="0"/>
+              <a:t>Metabolomics in process…</a:t>
+            </a:r>
+          </a:p>
+        </p:txBody>
+      </p:sp>
+      <p:sp>
+        <p:nvSpPr>
+          <p:cNvPr id="3" name="Content Placeholder 2">
+            <a:extLst>
+              <a:ext uri="{FF2B5EF4-FFF2-40B4-BE49-F238E27FC236}">
+                <a16:creationId xmlns:a16="http://schemas.microsoft.com/office/drawing/2014/main" id="{3EA535AE-9D0A-45AB-BEEC-9ADF4BC683A7}"/>
+              </a:ext>
+            </a:extLst>
+          </p:cNvPr>
+          <p:cNvSpPr>
+            <a:spLocks noGrp="1"/>
+          </p:cNvSpPr>
+          <p:nvPr>
+            <p:ph idx="1"/>
+          </p:nvPr>
+        </p:nvSpPr>
+        <p:spPr/>
+        <p:txBody>
+          <a:bodyPr/>
+          <a:lstStyle/>
+          <a:p>
+            <a:endParaRPr lang="en-US"/>
+          </a:p>
+        </p:txBody>
+      </p:sp>
+    </p:spTree>
+    <p:extLst>
+      <p:ext uri="{BB962C8B-B14F-4D97-AF65-F5344CB8AC3E}">
+        <p14:creationId xmlns:p14="http://schemas.microsoft.com/office/powerpoint/2010/main" val="255295389"/>
       </p:ext>
     </p:extLst>
   </p:cSld>
@@ -3901,12 +4502,47 @@
           <a:chExt cx="0" cy="0"/>
         </a:xfrm>
       </p:grpSpPr>
+      <p:sp>
+        <p:nvSpPr>
+          <p:cNvPr id="8" name="TextBox 7">
+            <a:extLst>
+              <a:ext uri="{FF2B5EF4-FFF2-40B4-BE49-F238E27FC236}">
+                <a16:creationId xmlns:a16="http://schemas.microsoft.com/office/drawing/2014/main" id="{9F4E6D35-57B4-4EB8-BB1C-36884EEE3B30}"/>
+              </a:ext>
+            </a:extLst>
+          </p:cNvPr>
+          <p:cNvSpPr txBox="1"/>
+          <p:nvPr/>
+        </p:nvSpPr>
+        <p:spPr>
+          <a:xfrm>
+            <a:off x="1039949" y="5259491"/>
+            <a:ext cx="9471785" cy="1477328"/>
+          </a:xfrm>
+          <a:prstGeom prst="rect">
+            <a:avLst/>
+          </a:prstGeom>
+          <a:noFill/>
+        </p:spPr>
+        <p:txBody>
+          <a:bodyPr wrap="square" rtlCol="0">
+            <a:spAutoFit/>
+          </a:bodyPr>
+          <a:lstStyle/>
+          <a:p>
+            <a:r>
+              <a:rPr lang="en-US" dirty="0"/>
+              <a:t>Body weight and SVL plot. Chlorpyrifos treatment ended up using slightly smaller salamanders, but this ended up not being an issue for the analysis (the points plot appears to be doubling the outlier, but that is a combination of the boxplot showing the outlier (black) and the jittered point plot (purple). This figure is not necessarily for the manuscripts main text, if used at all. The higher body weight outlier 24D salamander is the low concentration outlier on the next plot.</a:t>
+            </a:r>
+          </a:p>
+        </p:txBody>
+      </p:sp>
       <p:pic>
         <p:nvPicPr>
-          <p:cNvPr id="7" name="Picture 6" descr="Chart, box and whisker chart&#10;&#10;Description automatically generated">
-            <a:extLst>
-              <a:ext uri="{FF2B5EF4-FFF2-40B4-BE49-F238E27FC236}">
-                <a16:creationId xmlns:a16="http://schemas.microsoft.com/office/drawing/2014/main" id="{B97396F4-F72E-47B7-94F2-6E8BC7CC21D2}"/>
+          <p:cNvPr id="3" name="Picture 2" descr="Chart, box and whisker chart&#10;&#10;Description automatically generated">
+            <a:extLst>
+              <a:ext uri="{FF2B5EF4-FFF2-40B4-BE49-F238E27FC236}">
+                <a16:creationId xmlns:a16="http://schemas.microsoft.com/office/drawing/2014/main" id="{C8C6B5F2-CE61-4258-ABC0-56E06DF576D3}"/>
               </a:ext>
             </a:extLst>
           </p:cNvPr>
@@ -3929,49 +4565,14 @@
         </p:blipFill>
         <p:spPr>
           <a:xfrm>
-            <a:off x="1251238" y="103908"/>
-            <a:ext cx="9689523" cy="5536870"/>
+            <a:off x="907556" y="0"/>
+            <a:ext cx="9204110" cy="5259491"/>
           </a:xfrm>
           <a:prstGeom prst="rect">
             <a:avLst/>
           </a:prstGeom>
         </p:spPr>
       </p:pic>
-      <p:sp>
-        <p:nvSpPr>
-          <p:cNvPr id="8" name="TextBox 7">
-            <a:extLst>
-              <a:ext uri="{FF2B5EF4-FFF2-40B4-BE49-F238E27FC236}">
-                <a16:creationId xmlns:a16="http://schemas.microsoft.com/office/drawing/2014/main" id="{9F4E6D35-57B4-4EB8-BB1C-36884EEE3B30}"/>
-              </a:ext>
-            </a:extLst>
-          </p:cNvPr>
-          <p:cNvSpPr txBox="1"/>
-          <p:nvPr/>
-        </p:nvSpPr>
-        <p:spPr>
-          <a:xfrm>
-            <a:off x="2327564" y="5997039"/>
-            <a:ext cx="7695210" cy="646331"/>
-          </a:xfrm>
-          <a:prstGeom prst="rect">
-            <a:avLst/>
-          </a:prstGeom>
-          <a:noFill/>
-        </p:spPr>
-        <p:txBody>
-          <a:bodyPr wrap="square" rtlCol="0">
-            <a:spAutoFit/>
-          </a:bodyPr>
-          <a:lstStyle/>
-          <a:p>
-            <a:r>
-              <a:rPr lang="en-US" dirty="0"/>
-              <a:t>Chlorpyrifos treatment ended up using slightly smaller salamanders, but this ended up not being an issue for the analysis</a:t>
-            </a:r>
-          </a:p>
-        </p:txBody>
-      </p:sp>
     </p:spTree>
     <p:extLst>
       <p:ext uri="{BB962C8B-B14F-4D97-AF65-F5344CB8AC3E}">
@@ -4016,8 +4617,8 @@
         </p:nvSpPr>
         <p:spPr>
           <a:xfrm>
-            <a:off x="1046188" y="5771213"/>
-            <a:ext cx="9155875" cy="923330"/>
+            <a:off x="1046188" y="5247431"/>
+            <a:ext cx="9802325" cy="1477328"/>
           </a:xfrm>
           <a:prstGeom prst="rect">
             <a:avLst/>
@@ -4032,17 +4633,17 @@
           <a:p>
             <a:r>
               <a:rPr lang="en-US" dirty="0"/>
-              <a:t>Chlorpyrifos treatment ended up using slightly smaller salamanders, but this ended up not being an issue for the analysis (the points plot is appears to be doubling the outlier, but that is a combination of the boxplot showing the outlier and the point plot)</a:t>
+              <a:t>Glutathione variants. Glutathione used 1:5 and 1:8 dilution, we are using the averaged concentration for the analysis. The high control was dropped for the statistical comparisons. The points plot appears to be doubling that outlier, but that is a combination of both the boxplot showing that as an outlier and the points plot--these are now differentiated with the colors of black (part of the boxplot) and purple (the jittered sample point). This plot is not used for the manuscript. </a:t>
             </a:r>
           </a:p>
         </p:txBody>
       </p:sp>
       <p:pic>
         <p:nvPicPr>
-          <p:cNvPr id="3" name="Picture 2" descr="Chart, box and whisker chart&#10;&#10;Description automatically generated">
-            <a:extLst>
-              <a:ext uri="{FF2B5EF4-FFF2-40B4-BE49-F238E27FC236}">
-                <a16:creationId xmlns:a16="http://schemas.microsoft.com/office/drawing/2014/main" id="{E8DA716F-E60D-4500-BD3D-B8F18AD8D13A}"/>
+          <p:cNvPr id="4" name="Picture 3" descr="Chart, box and whisker chart&#10;&#10;Description automatically generated">
+            <a:extLst>
+              <a:ext uri="{FF2B5EF4-FFF2-40B4-BE49-F238E27FC236}">
+                <a16:creationId xmlns:a16="http://schemas.microsoft.com/office/drawing/2014/main" id="{2D6E6CCE-F498-4825-A774-BFA93258717B}"/>
               </a:ext>
             </a:extLst>
           </p:cNvPr>
@@ -4065,8 +4666,8 @@
         </p:blipFill>
         <p:spPr>
           <a:xfrm>
-            <a:off x="1046188" y="0"/>
-            <a:ext cx="10099623" cy="5771213"/>
+            <a:off x="1544669" y="195308"/>
+            <a:ext cx="8657394" cy="4947082"/>
           </a:xfrm>
           <a:prstGeom prst="rect">
             <a:avLst/>
@@ -4105,40 +4706,45 @@
       </p:grpSpPr>
       <p:pic>
         <p:nvPicPr>
-          <p:cNvPr id="4" name="Picture 3">
-            <a:extLst>
-              <a:ext uri="{FF2B5EF4-FFF2-40B4-BE49-F238E27FC236}">
-                <a16:creationId xmlns:a16="http://schemas.microsoft.com/office/drawing/2014/main" id="{F2EE64A4-7DEA-4FE5-BA43-13581EC692C9}"/>
+          <p:cNvPr id="5" name="Content Placeholder 4" descr="Chart, box and whisker chart&#10;&#10;Description automatically generated">
+            <a:extLst>
+              <a:ext uri="{FF2B5EF4-FFF2-40B4-BE49-F238E27FC236}">
+                <a16:creationId xmlns:a16="http://schemas.microsoft.com/office/drawing/2014/main" id="{EA58FFBD-54FE-4B28-A90A-7317002A06ED}"/>
               </a:ext>
             </a:extLst>
           </p:cNvPr>
           <p:cNvPicPr>
-            <a:picLocks noChangeAspect="1"/>
+            <a:picLocks noGrp="1" noChangeAspect="1"/>
           </p:cNvPicPr>
-          <p:nvPr/>
+          <p:nvPr>
+            <p:ph idx="1"/>
+          </p:nvPr>
         </p:nvPicPr>
         <p:blipFill>
-          <a:blip r:embed="rId2"/>
+          <a:blip r:embed="rId2">
+            <a:extLst>
+              <a:ext uri="{28A0092B-C50C-407E-A947-70E740481C1C}">
+                <a14:useLocalDpi xmlns:a14="http://schemas.microsoft.com/office/drawing/2010/main" val="0"/>
+              </a:ext>
+            </a:extLst>
+          </a:blip>
           <a:stretch>
             <a:fillRect/>
           </a:stretch>
         </p:blipFill>
         <p:spPr>
           <a:xfrm>
-            <a:off x="967418" y="481476"/>
-            <a:ext cx="10690443" cy="3294877"/>
-          </a:xfrm>
-          <a:prstGeom prst="rect">
-            <a:avLst/>
-          </a:prstGeom>
+            <a:off x="2381892" y="199856"/>
+            <a:ext cx="8370443" cy="4783110"/>
+          </a:xfrm>
         </p:spPr>
       </p:pic>
       <p:sp>
         <p:nvSpPr>
-          <p:cNvPr id="5" name="TextBox 4">
-            <a:extLst>
-              <a:ext uri="{FF2B5EF4-FFF2-40B4-BE49-F238E27FC236}">
-                <a16:creationId xmlns:a16="http://schemas.microsoft.com/office/drawing/2014/main" id="{22A635BB-139D-4362-AD08-66325DED4A4F}"/>
+          <p:cNvPr id="6" name="TextBox 5">
+            <a:extLst>
+              <a:ext uri="{FF2B5EF4-FFF2-40B4-BE49-F238E27FC236}">
+                <a16:creationId xmlns:a16="http://schemas.microsoft.com/office/drawing/2014/main" id="{59631EF1-1A3F-4887-B619-207BB3800C74}"/>
               </a:ext>
             </a:extLst>
           </p:cNvPr>
@@ -4147,8 +4753,8 @@
         </p:nvSpPr>
         <p:spPr>
           <a:xfrm>
-            <a:off x="1176817" y="4797436"/>
-            <a:ext cx="9155875" cy="369332"/>
+            <a:off x="1025640" y="4982966"/>
+            <a:ext cx="9155875" cy="1754326"/>
           </a:xfrm>
           <a:prstGeom prst="rect">
             <a:avLst/>
@@ -4163,7 +4769,15 @@
           <a:p>
             <a:r>
               <a:rPr lang="en-US" dirty="0"/>
-              <a:t>Summary stats before investigating outliers</a:t>
+              <a:t>This is the descriptive concentration figure for the manuscript with acetylcholinesterase and the averaged glutathione concentrations versus </a:t>
+            </a:r>
+            <a:r>
+              <a:rPr lang="en-US"/>
+              <a:t>the treatments. </a:t>
+            </a:r>
+            <a:r>
+              <a:rPr lang="en-US" dirty="0"/>
+              <a:t>The high control for glutathione, the low 24D glutathione, and 2 high acetylcholinesterase points were all dropped for the statistical comparisons. The points plot appears to be doubling outliers, but that is a combination of both the boxplot showing that as an outlier and the points plot--these are now differentiated with the colors of black (part of the boxplot) and purple (the jittered sample point).</a:t>
             </a:r>
           </a:p>
         </p:txBody>
@@ -4171,7 +4785,7 @@
     </p:spTree>
     <p:extLst>
       <p:ext uri="{BB962C8B-B14F-4D97-AF65-F5344CB8AC3E}">
-        <p14:creationId xmlns:p14="http://schemas.microsoft.com/office/powerpoint/2010/main" val="3714036470"/>
+        <p14:creationId xmlns:p14="http://schemas.microsoft.com/office/powerpoint/2010/main" val="3077837804"/>
       </p:ext>
     </p:extLst>
   </p:cSld>
@@ -4203,7 +4817,7 @@
           <p:cNvPr id="4" name="Picture 3">
             <a:extLst>
               <a:ext uri="{FF2B5EF4-FFF2-40B4-BE49-F238E27FC236}">
-                <a16:creationId xmlns:a16="http://schemas.microsoft.com/office/drawing/2014/main" id="{B9A72DDC-34F0-4D19-B886-AD2C87EABBAD}"/>
+                <a16:creationId xmlns:a16="http://schemas.microsoft.com/office/drawing/2014/main" id="{F2EE64A4-7DEA-4FE5-BA43-13581EC692C9}"/>
               </a:ext>
             </a:extLst>
           </p:cNvPr>
@@ -4220,8 +4834,8 @@
         </p:blipFill>
         <p:spPr>
           <a:xfrm>
-            <a:off x="1420418" y="534390"/>
-            <a:ext cx="8812987" cy="3443844"/>
+            <a:off x="967418" y="481476"/>
+            <a:ext cx="10690443" cy="3294877"/>
           </a:xfrm>
           <a:prstGeom prst="rect">
             <a:avLst/>
@@ -4233,7 +4847,7 @@
           <p:cNvPr id="5" name="TextBox 4">
             <a:extLst>
               <a:ext uri="{FF2B5EF4-FFF2-40B4-BE49-F238E27FC236}">
-                <a16:creationId xmlns:a16="http://schemas.microsoft.com/office/drawing/2014/main" id="{CB8C9757-AC18-4F55-ABD7-E7FDC8B82537}"/>
+                <a16:creationId xmlns:a16="http://schemas.microsoft.com/office/drawing/2014/main" id="{22A635BB-139D-4362-AD08-66325DED4A4F}"/>
               </a:ext>
             </a:extLst>
           </p:cNvPr>
@@ -4242,7 +4856,7 @@
         </p:nvSpPr>
         <p:spPr>
           <a:xfrm>
-            <a:off x="1077530" y="4797436"/>
+            <a:off x="1176817" y="4797436"/>
             <a:ext cx="9155875" cy="369332"/>
           </a:xfrm>
           <a:prstGeom prst="rect">
@@ -4258,89 +4872,15 @@
           <a:p>
             <a:r>
               <a:rPr lang="en-US" dirty="0"/>
-              <a:t>Shapiro tests show some normality rejections</a:t>
-            </a:r>
-          </a:p>
-        </p:txBody>
-      </p:sp>
-      <p:sp>
-        <p:nvSpPr>
-          <p:cNvPr id="7" name="TextBox 6">
-            <a:extLst>
-              <a:ext uri="{FF2B5EF4-FFF2-40B4-BE49-F238E27FC236}">
-                <a16:creationId xmlns:a16="http://schemas.microsoft.com/office/drawing/2014/main" id="{4078E5BC-6F73-4B98-8F1F-32D180E65BE4}"/>
-              </a:ext>
-            </a:extLst>
-          </p:cNvPr>
-          <p:cNvSpPr txBox="1"/>
-          <p:nvPr/>
-        </p:nvSpPr>
-        <p:spPr>
-          <a:xfrm>
-            <a:off x="7018317" y="3325091"/>
-            <a:ext cx="1710047" cy="380010"/>
-          </a:xfrm>
-          <a:prstGeom prst="rect">
-            <a:avLst/>
-          </a:prstGeom>
-          <a:noFill/>
-          <a:ln w="38100">
-            <a:solidFill>
-              <a:srgbClr val="FF0000"/>
-            </a:solidFill>
-          </a:ln>
-        </p:spPr>
-        <p:txBody>
-          <a:bodyPr wrap="square" rtlCol="0">
-            <a:spAutoFit/>
-          </a:bodyPr>
-          <a:lstStyle/>
-          <a:p>
-            <a:endParaRPr lang="en-US" dirty="0"/>
-          </a:p>
-        </p:txBody>
-      </p:sp>
-      <p:sp>
-        <p:nvSpPr>
-          <p:cNvPr id="9" name="TextBox 8">
-            <a:extLst>
-              <a:ext uri="{FF2B5EF4-FFF2-40B4-BE49-F238E27FC236}">
-                <a16:creationId xmlns:a16="http://schemas.microsoft.com/office/drawing/2014/main" id="{AB7830FD-54A8-4634-9DAE-AED1379742F9}"/>
-              </a:ext>
-            </a:extLst>
-          </p:cNvPr>
-          <p:cNvSpPr txBox="1"/>
-          <p:nvPr/>
-        </p:nvSpPr>
-        <p:spPr>
-          <a:xfrm>
-            <a:off x="7018316" y="1691231"/>
-            <a:ext cx="1828801" cy="576955"/>
-          </a:xfrm>
-          <a:prstGeom prst="rect">
-            <a:avLst/>
-          </a:prstGeom>
-          <a:noFill/>
-          <a:ln w="38100">
-            <a:solidFill>
-              <a:srgbClr val="FF0000"/>
-            </a:solidFill>
-          </a:ln>
-        </p:spPr>
-        <p:txBody>
-          <a:bodyPr wrap="square" rtlCol="0">
-            <a:spAutoFit/>
-          </a:bodyPr>
-          <a:lstStyle/>
-          <a:p>
-            <a:endParaRPr lang="en-US" dirty="0"/>
+              <a:t>Summary stats before investigating outliers</a:t>
+            </a:r>
           </a:p>
         </p:txBody>
       </p:sp>
     </p:spTree>
     <p:extLst>
       <p:ext uri="{BB962C8B-B14F-4D97-AF65-F5344CB8AC3E}">
-        <p14:creationId xmlns:p14="http://schemas.microsoft.com/office/powerpoint/2010/main" val="304038467"/>
+        <p14:creationId xmlns:p14="http://schemas.microsoft.com/office/powerpoint/2010/main" val="3714036470"/>
       </p:ext>
     </p:extLst>
   </p:cSld>
@@ -4372,7 +4912,7 @@
           <p:cNvPr id="4" name="Picture 3">
             <a:extLst>
               <a:ext uri="{FF2B5EF4-FFF2-40B4-BE49-F238E27FC236}">
-                <a16:creationId xmlns:a16="http://schemas.microsoft.com/office/drawing/2014/main" id="{CF603D98-5838-4E52-AE7E-9DBB0638FCE5}"/>
+                <a16:creationId xmlns:a16="http://schemas.microsoft.com/office/drawing/2014/main" id="{B9A72DDC-34F0-4D19-B886-AD2C87EABBAD}"/>
               </a:ext>
             </a:extLst>
           </p:cNvPr>
@@ -4389,8 +4929,8 @@
         </p:blipFill>
         <p:spPr>
           <a:xfrm>
-            <a:off x="289090" y="375619"/>
-            <a:ext cx="11184904" cy="3614490"/>
+            <a:off x="1420418" y="534390"/>
+            <a:ext cx="8812987" cy="3443844"/>
           </a:xfrm>
           <a:prstGeom prst="rect">
             <a:avLst/>
@@ -4402,7 +4942,7 @@
           <p:cNvPr id="5" name="TextBox 4">
             <a:extLst>
               <a:ext uri="{FF2B5EF4-FFF2-40B4-BE49-F238E27FC236}">
-                <a16:creationId xmlns:a16="http://schemas.microsoft.com/office/drawing/2014/main" id="{86AF5802-0FF4-4A0D-A3F8-A006C6B62EFC}"/>
+                <a16:creationId xmlns:a16="http://schemas.microsoft.com/office/drawing/2014/main" id="{CB8C9757-AC18-4F55-ABD7-E7FDC8B82537}"/>
               </a:ext>
             </a:extLst>
           </p:cNvPr>
@@ -4427,17 +4967,17 @@
           <a:p>
             <a:r>
               <a:rPr lang="en-US" dirty="0"/>
-              <a:t>Identify outliers, 4 outliers seen across the 2 response variables, none extreme</a:t>
-            </a:r>
-          </a:p>
-        </p:txBody>
-      </p:sp>
-      <p:sp>
-        <p:nvSpPr>
-          <p:cNvPr id="6" name="TextBox 5">
-            <a:extLst>
-              <a:ext uri="{FF2B5EF4-FFF2-40B4-BE49-F238E27FC236}">
-                <a16:creationId xmlns:a16="http://schemas.microsoft.com/office/drawing/2014/main" id="{067193CE-22F0-4CAF-8E97-82D85195E8D8}"/>
+              <a:t>Shapiro tests show some normality rejections</a:t>
+            </a:r>
+          </a:p>
+        </p:txBody>
+      </p:sp>
+      <p:sp>
+        <p:nvSpPr>
+          <p:cNvPr id="7" name="TextBox 6">
+            <a:extLst>
+              <a:ext uri="{FF2B5EF4-FFF2-40B4-BE49-F238E27FC236}">
+                <a16:creationId xmlns:a16="http://schemas.microsoft.com/office/drawing/2014/main" id="{4078E5BC-6F73-4B98-8F1F-32D180E65BE4}"/>
               </a:ext>
             </a:extLst>
           </p:cNvPr>
@@ -4446,8 +4986,8 @@
         </p:nvSpPr>
         <p:spPr>
           <a:xfrm>
-            <a:off x="9143999" y="1107338"/>
-            <a:ext cx="1089406" cy="2657140"/>
+            <a:off x="7018317" y="3325091"/>
+            <a:ext cx="1710047" cy="380010"/>
           </a:xfrm>
           <a:prstGeom prst="rect">
             <a:avLst/>
@@ -4471,10 +5011,10 @@
       </p:sp>
       <p:sp>
         <p:nvSpPr>
-          <p:cNvPr id="7" name="TextBox 6">
-            <a:extLst>
-              <a:ext uri="{FF2B5EF4-FFF2-40B4-BE49-F238E27FC236}">
-                <a16:creationId xmlns:a16="http://schemas.microsoft.com/office/drawing/2014/main" id="{E9143364-4761-44F6-B525-8663832274D6}"/>
+          <p:cNvPr id="9" name="TextBox 8">
+            <a:extLst>
+              <a:ext uri="{FF2B5EF4-FFF2-40B4-BE49-F238E27FC236}">
+                <a16:creationId xmlns:a16="http://schemas.microsoft.com/office/drawing/2014/main" id="{AB7830FD-54A8-4634-9DAE-AED1379742F9}"/>
               </a:ext>
             </a:extLst>
           </p:cNvPr>
@@ -4483,8 +5023,8 @@
         </p:nvSpPr>
         <p:spPr>
           <a:xfrm>
-            <a:off x="1413892" y="1107338"/>
-            <a:ext cx="1089406" cy="2657140"/>
+            <a:off x="7018316" y="1691231"/>
+            <a:ext cx="1828801" cy="576955"/>
           </a:xfrm>
           <a:prstGeom prst="rect">
             <a:avLst/>
@@ -4509,7 +5049,7 @@
     </p:spTree>
     <p:extLst>
       <p:ext uri="{BB962C8B-B14F-4D97-AF65-F5344CB8AC3E}">
-        <p14:creationId xmlns:p14="http://schemas.microsoft.com/office/powerpoint/2010/main" val="1615585269"/>
+        <p14:creationId xmlns:p14="http://schemas.microsoft.com/office/powerpoint/2010/main" val="304038467"/>
       </p:ext>
     </p:extLst>
   </p:cSld>
@@ -4538,10 +5078,10 @@
       </p:grpSpPr>
       <p:pic>
         <p:nvPicPr>
-          <p:cNvPr id="5" name="Picture 4">
-            <a:extLst>
-              <a:ext uri="{FF2B5EF4-FFF2-40B4-BE49-F238E27FC236}">
-                <a16:creationId xmlns:a16="http://schemas.microsoft.com/office/drawing/2014/main" id="{78313618-686E-4270-BCCA-4D0B7F78B44C}"/>
+          <p:cNvPr id="4" name="Picture 3">
+            <a:extLst>
+              <a:ext uri="{FF2B5EF4-FFF2-40B4-BE49-F238E27FC236}">
+                <a16:creationId xmlns:a16="http://schemas.microsoft.com/office/drawing/2014/main" id="{CF603D98-5838-4E52-AE7E-9DBB0638FCE5}"/>
               </a:ext>
             </a:extLst>
           </p:cNvPr>
@@ -4558,8 +5098,8 @@
         </p:blipFill>
         <p:spPr>
           <a:xfrm>
-            <a:off x="1449526" y="272638"/>
-            <a:ext cx="9292948" cy="4406240"/>
+            <a:off x="289090" y="375619"/>
+            <a:ext cx="11184904" cy="3614490"/>
           </a:xfrm>
           <a:prstGeom prst="rect">
             <a:avLst/>
@@ -4568,10 +5108,10 @@
       </p:pic>
       <p:sp>
         <p:nvSpPr>
-          <p:cNvPr id="6" name="TextBox 5">
-            <a:extLst>
-              <a:ext uri="{FF2B5EF4-FFF2-40B4-BE49-F238E27FC236}">
-                <a16:creationId xmlns:a16="http://schemas.microsoft.com/office/drawing/2014/main" id="{394856D6-D891-4E90-A043-86F610FCF429}"/>
+          <p:cNvPr id="5" name="TextBox 4">
+            <a:extLst>
+              <a:ext uri="{FF2B5EF4-FFF2-40B4-BE49-F238E27FC236}">
+                <a16:creationId xmlns:a16="http://schemas.microsoft.com/office/drawing/2014/main" id="{86AF5802-0FF4-4A0D-A3F8-A006C6B62EFC}"/>
               </a:ext>
             </a:extLst>
           </p:cNvPr>
@@ -4596,17 +5136,17 @@
           <a:p>
             <a:r>
               <a:rPr lang="en-US" dirty="0"/>
-              <a:t>Normality tests mostly cleared up</a:t>
-            </a:r>
-          </a:p>
-        </p:txBody>
-      </p:sp>
-      <p:sp>
-        <p:nvSpPr>
-          <p:cNvPr id="7" name="TextBox 6">
-            <a:extLst>
-              <a:ext uri="{FF2B5EF4-FFF2-40B4-BE49-F238E27FC236}">
-                <a16:creationId xmlns:a16="http://schemas.microsoft.com/office/drawing/2014/main" id="{A76DF30E-A658-4E2B-816C-39CA95EE8083}"/>
+              <a:t>Identify outliers, 4 outliers seen across the 2 response variables, none extreme</a:t>
+            </a:r>
+          </a:p>
+        </p:txBody>
+      </p:sp>
+      <p:sp>
+        <p:nvSpPr>
+          <p:cNvPr id="6" name="TextBox 5">
+            <a:extLst>
+              <a:ext uri="{FF2B5EF4-FFF2-40B4-BE49-F238E27FC236}">
+                <a16:creationId xmlns:a16="http://schemas.microsoft.com/office/drawing/2014/main" id="{067193CE-22F0-4CAF-8E97-82D85195E8D8}"/>
               </a:ext>
             </a:extLst>
           </p:cNvPr>
@@ -4615,8 +5155,8 @@
         </p:nvSpPr>
         <p:spPr>
           <a:xfrm>
-            <a:off x="6365174" y="2695698"/>
-            <a:ext cx="1710047" cy="380010"/>
+            <a:off x="9143999" y="1107338"/>
+            <a:ext cx="1089406" cy="2657140"/>
           </a:xfrm>
           <a:prstGeom prst="rect">
             <a:avLst/>
@@ -4638,10 +5178,47 @@
           </a:p>
         </p:txBody>
       </p:sp>
+      <p:sp>
+        <p:nvSpPr>
+          <p:cNvPr id="7" name="TextBox 6">
+            <a:extLst>
+              <a:ext uri="{FF2B5EF4-FFF2-40B4-BE49-F238E27FC236}">
+                <a16:creationId xmlns:a16="http://schemas.microsoft.com/office/drawing/2014/main" id="{E9143364-4761-44F6-B525-8663832274D6}"/>
+              </a:ext>
+            </a:extLst>
+          </p:cNvPr>
+          <p:cNvSpPr txBox="1"/>
+          <p:nvPr/>
+        </p:nvSpPr>
+        <p:spPr>
+          <a:xfrm>
+            <a:off x="1413892" y="1107338"/>
+            <a:ext cx="1089406" cy="2657140"/>
+          </a:xfrm>
+          <a:prstGeom prst="rect">
+            <a:avLst/>
+          </a:prstGeom>
+          <a:noFill/>
+          <a:ln w="38100">
+            <a:solidFill>
+              <a:srgbClr val="FF0000"/>
+            </a:solidFill>
+          </a:ln>
+        </p:spPr>
+        <p:txBody>
+          <a:bodyPr wrap="square" rtlCol="0">
+            <a:spAutoFit/>
+          </a:bodyPr>
+          <a:lstStyle/>
+          <a:p>
+            <a:endParaRPr lang="en-US" dirty="0"/>
+          </a:p>
+        </p:txBody>
+      </p:sp>
     </p:spTree>
     <p:extLst>
       <p:ext uri="{BB962C8B-B14F-4D97-AF65-F5344CB8AC3E}">
-        <p14:creationId xmlns:p14="http://schemas.microsoft.com/office/powerpoint/2010/main" val="1919357964"/>
+        <p14:creationId xmlns:p14="http://schemas.microsoft.com/office/powerpoint/2010/main" val="1615585269"/>
       </p:ext>
     </p:extLst>
   </p:cSld>
@@ -4670,10 +5247,10 @@
       </p:grpSpPr>
       <p:pic>
         <p:nvPicPr>
-          <p:cNvPr id="4" name="Picture 3">
-            <a:extLst>
-              <a:ext uri="{FF2B5EF4-FFF2-40B4-BE49-F238E27FC236}">
-                <a16:creationId xmlns:a16="http://schemas.microsoft.com/office/drawing/2014/main" id="{B8B6841A-DBD4-47D5-819C-4DCF81BD4581}"/>
+          <p:cNvPr id="5" name="Picture 4">
+            <a:extLst>
+              <a:ext uri="{FF2B5EF4-FFF2-40B4-BE49-F238E27FC236}">
+                <a16:creationId xmlns:a16="http://schemas.microsoft.com/office/drawing/2014/main" id="{78313618-686E-4270-BCCA-4D0B7F78B44C}"/>
               </a:ext>
             </a:extLst>
           </p:cNvPr>
@@ -4690,8 +5267,8 @@
         </p:blipFill>
         <p:spPr>
           <a:xfrm>
-            <a:off x="3041591" y="380011"/>
-            <a:ext cx="5637229" cy="4616594"/>
+            <a:off x="1449526" y="272638"/>
+            <a:ext cx="9292948" cy="4406240"/>
           </a:xfrm>
           <a:prstGeom prst="rect">
             <a:avLst/>
@@ -4700,10 +5277,10 @@
       </p:pic>
       <p:sp>
         <p:nvSpPr>
-          <p:cNvPr id="5" name="TextBox 4">
-            <a:extLst>
-              <a:ext uri="{FF2B5EF4-FFF2-40B4-BE49-F238E27FC236}">
-                <a16:creationId xmlns:a16="http://schemas.microsoft.com/office/drawing/2014/main" id="{B90F1ADB-570E-4C0F-991E-BAA872E96CA6}"/>
+          <p:cNvPr id="6" name="TextBox 5">
+            <a:extLst>
+              <a:ext uri="{FF2B5EF4-FFF2-40B4-BE49-F238E27FC236}">
+                <a16:creationId xmlns:a16="http://schemas.microsoft.com/office/drawing/2014/main" id="{394856D6-D891-4E90-A043-86F610FCF429}"/>
               </a:ext>
             </a:extLst>
           </p:cNvPr>
@@ -4712,7 +5289,7 @@
         </p:nvSpPr>
         <p:spPr>
           <a:xfrm>
-            <a:off x="1053779" y="5213073"/>
+            <a:off x="1077530" y="4797436"/>
             <a:ext cx="9155875" cy="369332"/>
           </a:xfrm>
           <a:prstGeom prst="rect">
@@ -4728,15 +5305,52 @@
           <a:p>
             <a:r>
               <a:rPr lang="en-US" dirty="0"/>
-              <a:t>Snout-vent-length and body weight significantly related as, but not a big deal for treatment</a:t>
-            </a:r>
+              <a:t>Normality tests mostly cleared up</a:t>
+            </a:r>
+          </a:p>
+        </p:txBody>
+      </p:sp>
+      <p:sp>
+        <p:nvSpPr>
+          <p:cNvPr id="7" name="TextBox 6">
+            <a:extLst>
+              <a:ext uri="{FF2B5EF4-FFF2-40B4-BE49-F238E27FC236}">
+                <a16:creationId xmlns:a16="http://schemas.microsoft.com/office/drawing/2014/main" id="{A76DF30E-A658-4E2B-816C-39CA95EE8083}"/>
+              </a:ext>
+            </a:extLst>
+          </p:cNvPr>
+          <p:cNvSpPr txBox="1"/>
+          <p:nvPr/>
+        </p:nvSpPr>
+        <p:spPr>
+          <a:xfrm>
+            <a:off x="6365174" y="2695698"/>
+            <a:ext cx="1710047" cy="380010"/>
+          </a:xfrm>
+          <a:prstGeom prst="rect">
+            <a:avLst/>
+          </a:prstGeom>
+          <a:noFill/>
+          <a:ln w="38100">
+            <a:solidFill>
+              <a:srgbClr val="FF0000"/>
+            </a:solidFill>
+          </a:ln>
+        </p:spPr>
+        <p:txBody>
+          <a:bodyPr wrap="square" rtlCol="0">
+            <a:spAutoFit/>
+          </a:bodyPr>
+          <a:lstStyle/>
+          <a:p>
+            <a:endParaRPr lang="en-US" dirty="0"/>
           </a:p>
         </p:txBody>
       </p:sp>
     </p:spTree>
     <p:extLst>
       <p:ext uri="{BB962C8B-B14F-4D97-AF65-F5344CB8AC3E}">
-        <p14:creationId xmlns:p14="http://schemas.microsoft.com/office/powerpoint/2010/main" val="1147033632"/>
+        <p14:creationId xmlns:p14="http://schemas.microsoft.com/office/powerpoint/2010/main" val="1919357964"/>
       </p:ext>
     </p:extLst>
   </p:cSld>
@@ -4765,10 +5379,10 @@
       </p:grpSpPr>
       <p:pic>
         <p:nvPicPr>
-          <p:cNvPr id="7" name="Picture 6">
-            <a:extLst>
-              <a:ext uri="{FF2B5EF4-FFF2-40B4-BE49-F238E27FC236}">
-                <a16:creationId xmlns:a16="http://schemas.microsoft.com/office/drawing/2014/main" id="{FCD14FDF-BB33-479C-872C-4AEC126E0EB1}"/>
+          <p:cNvPr id="4" name="Picture 3">
+            <a:extLst>
+              <a:ext uri="{FF2B5EF4-FFF2-40B4-BE49-F238E27FC236}">
+                <a16:creationId xmlns:a16="http://schemas.microsoft.com/office/drawing/2014/main" id="{B8B6841A-DBD4-47D5-819C-4DCF81BD4581}"/>
               </a:ext>
             </a:extLst>
           </p:cNvPr>
@@ -4785,50 +5399,20 @@
         </p:blipFill>
         <p:spPr>
           <a:xfrm>
-            <a:off x="0" y="0"/>
-            <a:ext cx="9814574" cy="3702570"/>
+            <a:off x="3041591" y="380011"/>
+            <a:ext cx="5637229" cy="4616594"/>
           </a:xfrm>
           <a:prstGeom prst="rect">
             <a:avLst/>
           </a:prstGeom>
         </p:spPr>
       </p:pic>
-      <p:pic>
-        <p:nvPicPr>
-          <p:cNvPr id="8" name="Picture 7">
-            <a:extLst>
-              <a:ext uri="{FF2B5EF4-FFF2-40B4-BE49-F238E27FC236}">
-                <a16:creationId xmlns:a16="http://schemas.microsoft.com/office/drawing/2014/main" id="{C09A266D-1154-43AA-8598-5C968F37CC76}"/>
-              </a:ext>
-            </a:extLst>
-          </p:cNvPr>
-          <p:cNvPicPr>
-            <a:picLocks noChangeAspect="1"/>
-          </p:cNvPicPr>
-          <p:nvPr/>
-        </p:nvPicPr>
-        <p:blipFill>
-          <a:blip r:embed="rId3"/>
-          <a:stretch>
-            <a:fillRect/>
-          </a:stretch>
-        </p:blipFill>
-        <p:spPr>
-          <a:xfrm>
-            <a:off x="2749191" y="3278786"/>
-            <a:ext cx="9442809" cy="3579214"/>
-          </a:xfrm>
-          <a:prstGeom prst="rect">
-            <a:avLst/>
-          </a:prstGeom>
-        </p:spPr>
-      </p:pic>
-      <p:sp>
-        <p:nvSpPr>
-          <p:cNvPr id="9" name="TextBox 8">
-            <a:extLst>
-              <a:ext uri="{FF2B5EF4-FFF2-40B4-BE49-F238E27FC236}">
-                <a16:creationId xmlns:a16="http://schemas.microsoft.com/office/drawing/2014/main" id="{BC07244D-294C-4D5B-8815-71CD060CA95A}"/>
+      <p:sp>
+        <p:nvSpPr>
+          <p:cNvPr id="5" name="TextBox 4">
+            <a:extLst>
+              <a:ext uri="{FF2B5EF4-FFF2-40B4-BE49-F238E27FC236}">
+                <a16:creationId xmlns:a16="http://schemas.microsoft.com/office/drawing/2014/main" id="{B90F1ADB-570E-4C0F-991E-BAA872E96CA6}"/>
               </a:ext>
             </a:extLst>
           </p:cNvPr>
@@ -4837,8 +5421,8 @@
         </p:nvSpPr>
         <p:spPr>
           <a:xfrm>
-            <a:off x="9814573" y="149902"/>
-            <a:ext cx="1128247" cy="646331"/>
+            <a:off x="1053779" y="5213073"/>
+            <a:ext cx="9155875" cy="369332"/>
           </a:xfrm>
           <a:prstGeom prst="rect">
             <a:avLst/>
@@ -4853,393 +5437,7 @@
           <a:p>
             <a:r>
               <a:rPr lang="en-US" dirty="0"/>
-              <a:t>1:5</a:t>
-            </a:r>
-          </a:p>
-          <a:p>
-            <a:r>
-              <a:rPr lang="en-US" dirty="0"/>
-              <a:t>24d</a:t>
-            </a:r>
-          </a:p>
-        </p:txBody>
-      </p:sp>
-      <p:sp>
-        <p:nvSpPr>
-          <p:cNvPr id="10" name="TextBox 9">
-            <a:extLst>
-              <a:ext uri="{FF2B5EF4-FFF2-40B4-BE49-F238E27FC236}">
-                <a16:creationId xmlns:a16="http://schemas.microsoft.com/office/drawing/2014/main" id="{1871EB22-F10A-4181-8810-3A258E8063BC}"/>
-              </a:ext>
-            </a:extLst>
-          </p:cNvPr>
-          <p:cNvSpPr txBox="1"/>
-          <p:nvPr/>
-        </p:nvSpPr>
-        <p:spPr>
-          <a:xfrm>
-            <a:off x="1470081" y="5978124"/>
-            <a:ext cx="1128247" cy="646331"/>
-          </a:xfrm>
-          <a:prstGeom prst="rect">
-            <a:avLst/>
-          </a:prstGeom>
-          <a:noFill/>
-        </p:spPr>
-        <p:txBody>
-          <a:bodyPr wrap="square" rtlCol="0">
-            <a:spAutoFit/>
-          </a:bodyPr>
-          <a:lstStyle/>
-          <a:p>
-            <a:r>
-              <a:rPr lang="en-US" dirty="0"/>
-              <a:t>1:8</a:t>
-            </a:r>
-          </a:p>
-          <a:p>
-            <a:r>
-              <a:rPr lang="en-US" dirty="0"/>
-              <a:t>24d</a:t>
-            </a:r>
-          </a:p>
-        </p:txBody>
-      </p:sp>
-      <p:sp>
-        <p:nvSpPr>
-          <p:cNvPr id="11" name="TextBox 10">
-            <a:extLst>
-              <a:ext uri="{FF2B5EF4-FFF2-40B4-BE49-F238E27FC236}">
-                <a16:creationId xmlns:a16="http://schemas.microsoft.com/office/drawing/2014/main" id="{963B7C31-AB2D-48FA-BB75-287961F1FBCB}"/>
-              </a:ext>
-            </a:extLst>
-          </p:cNvPr>
-          <p:cNvSpPr txBox="1"/>
-          <p:nvPr/>
-        </p:nvSpPr>
-        <p:spPr>
-          <a:xfrm>
-            <a:off x="0" y="1815659"/>
-            <a:ext cx="1947553" cy="298149"/>
-          </a:xfrm>
-          <a:prstGeom prst="rect">
-            <a:avLst/>
-          </a:prstGeom>
-          <a:noFill/>
-          <a:ln w="38100">
-            <a:solidFill>
-              <a:srgbClr val="FF0000"/>
-            </a:solidFill>
-          </a:ln>
-        </p:spPr>
-        <p:txBody>
-          <a:bodyPr wrap="square" rtlCol="0">
-            <a:spAutoFit/>
-          </a:bodyPr>
-          <a:lstStyle/>
-          <a:p>
-            <a:endParaRPr lang="en-US" dirty="0"/>
-          </a:p>
-        </p:txBody>
-      </p:sp>
-      <p:sp>
-        <p:nvSpPr>
-          <p:cNvPr id="12" name="TextBox 11">
-            <a:extLst>
-              <a:ext uri="{FF2B5EF4-FFF2-40B4-BE49-F238E27FC236}">
-                <a16:creationId xmlns:a16="http://schemas.microsoft.com/office/drawing/2014/main" id="{544525F6-A5AE-477F-A613-D1CF6CD08E88}"/>
-              </a:ext>
-            </a:extLst>
-          </p:cNvPr>
-          <p:cNvSpPr txBox="1"/>
-          <p:nvPr/>
-        </p:nvSpPr>
-        <p:spPr>
-          <a:xfrm>
-            <a:off x="2751002" y="6553912"/>
-            <a:ext cx="1947553" cy="298149"/>
-          </a:xfrm>
-          <a:prstGeom prst="rect">
-            <a:avLst/>
-          </a:prstGeom>
-          <a:noFill/>
-          <a:ln w="38100">
-            <a:solidFill>
-              <a:srgbClr val="FF0000"/>
-            </a:solidFill>
-          </a:ln>
-        </p:spPr>
-        <p:txBody>
-          <a:bodyPr wrap="square" rtlCol="0">
-            <a:spAutoFit/>
-          </a:bodyPr>
-          <a:lstStyle/>
-          <a:p>
-            <a:endParaRPr lang="en-US" dirty="0"/>
-          </a:p>
-        </p:txBody>
-      </p:sp>
-      <p:sp>
-        <p:nvSpPr>
-          <p:cNvPr id="13" name="TextBox 12">
-            <a:extLst>
-              <a:ext uri="{FF2B5EF4-FFF2-40B4-BE49-F238E27FC236}">
-                <a16:creationId xmlns:a16="http://schemas.microsoft.com/office/drawing/2014/main" id="{C25BD4F0-EF30-4B5C-9689-F58B5C3F6822}"/>
-              </a:ext>
-            </a:extLst>
-          </p:cNvPr>
-          <p:cNvSpPr txBox="1"/>
-          <p:nvPr/>
-        </p:nvSpPr>
-        <p:spPr>
-          <a:xfrm>
-            <a:off x="2774753" y="4982135"/>
-            <a:ext cx="1947553" cy="298149"/>
-          </a:xfrm>
-          <a:prstGeom prst="rect">
-            <a:avLst/>
-          </a:prstGeom>
-          <a:noFill/>
-          <a:ln w="38100">
-            <a:solidFill>
-              <a:srgbClr val="FF0000"/>
-            </a:solidFill>
-          </a:ln>
-        </p:spPr>
-        <p:txBody>
-          <a:bodyPr wrap="square" rtlCol="0">
-            <a:spAutoFit/>
-          </a:bodyPr>
-          <a:lstStyle/>
-          <a:p>
-            <a:endParaRPr lang="en-US" dirty="0"/>
-          </a:p>
-        </p:txBody>
-      </p:sp>
-      <p:sp>
-        <p:nvSpPr>
-          <p:cNvPr id="14" name="TextBox 13">
-            <a:extLst>
-              <a:ext uri="{FF2B5EF4-FFF2-40B4-BE49-F238E27FC236}">
-                <a16:creationId xmlns:a16="http://schemas.microsoft.com/office/drawing/2014/main" id="{2E10BCBE-9D39-4E31-B7A6-748D3F9848F3}"/>
-              </a:ext>
-            </a:extLst>
-          </p:cNvPr>
-          <p:cNvSpPr txBox="1"/>
-          <p:nvPr/>
-        </p:nvSpPr>
-        <p:spPr>
-          <a:xfrm>
-            <a:off x="0" y="3434938"/>
-            <a:ext cx="1947553" cy="298149"/>
-          </a:xfrm>
-          <a:prstGeom prst="rect">
-            <a:avLst/>
-          </a:prstGeom>
-          <a:noFill/>
-          <a:ln w="38100">
-            <a:solidFill>
-              <a:srgbClr val="FF0000"/>
-            </a:solidFill>
-          </a:ln>
-        </p:spPr>
-        <p:txBody>
-          <a:bodyPr wrap="square" rtlCol="0">
-            <a:spAutoFit/>
-          </a:bodyPr>
-          <a:lstStyle/>
-          <a:p>
-            <a:endParaRPr lang="en-US" dirty="0"/>
-          </a:p>
-        </p:txBody>
-      </p:sp>
-      <p:sp>
-        <p:nvSpPr>
-          <p:cNvPr id="15" name="TextBox 14">
-            <a:extLst>
-              <a:ext uri="{FF2B5EF4-FFF2-40B4-BE49-F238E27FC236}">
-                <a16:creationId xmlns:a16="http://schemas.microsoft.com/office/drawing/2014/main" id="{1E05821F-7C52-4BD8-B766-EBE0DCA992D6}"/>
-              </a:ext>
-            </a:extLst>
-          </p:cNvPr>
-          <p:cNvSpPr txBox="1"/>
-          <p:nvPr/>
-        </p:nvSpPr>
-        <p:spPr>
-          <a:xfrm>
-            <a:off x="4845450" y="5586995"/>
-            <a:ext cx="1947553" cy="298149"/>
-          </a:xfrm>
-          <a:prstGeom prst="rect">
-            <a:avLst/>
-          </a:prstGeom>
-          <a:noFill/>
-          <a:ln w="38100">
-            <a:solidFill>
-              <a:srgbClr val="FF0000"/>
-            </a:solidFill>
-          </a:ln>
-        </p:spPr>
-        <p:txBody>
-          <a:bodyPr wrap="square" rtlCol="0">
-            <a:spAutoFit/>
-          </a:bodyPr>
-          <a:lstStyle/>
-          <a:p>
-            <a:endParaRPr lang="en-US" dirty="0"/>
-          </a:p>
-        </p:txBody>
-      </p:sp>
-      <p:sp>
-        <p:nvSpPr>
-          <p:cNvPr id="16" name="TextBox 15">
-            <a:extLst>
-              <a:ext uri="{FF2B5EF4-FFF2-40B4-BE49-F238E27FC236}">
-                <a16:creationId xmlns:a16="http://schemas.microsoft.com/office/drawing/2014/main" id="{EBAE140D-EBD1-4737-8B46-7F65C5547E5C}"/>
-              </a:ext>
-            </a:extLst>
-          </p:cNvPr>
-          <p:cNvSpPr txBox="1"/>
-          <p:nvPr/>
-        </p:nvSpPr>
-        <p:spPr>
-          <a:xfrm>
-            <a:off x="4845451" y="4047171"/>
-            <a:ext cx="1947553" cy="298149"/>
-          </a:xfrm>
-          <a:prstGeom prst="rect">
-            <a:avLst/>
-          </a:prstGeom>
-          <a:noFill/>
-          <a:ln w="38100">
-            <a:solidFill>
-              <a:srgbClr val="FF0000"/>
-            </a:solidFill>
-          </a:ln>
-        </p:spPr>
-        <p:txBody>
-          <a:bodyPr wrap="square" rtlCol="0">
-            <a:spAutoFit/>
-          </a:bodyPr>
-          <a:lstStyle/>
-          <a:p>
-            <a:endParaRPr lang="en-US" dirty="0"/>
-          </a:p>
-        </p:txBody>
-      </p:sp>
-      <p:sp>
-        <p:nvSpPr>
-          <p:cNvPr id="17" name="TextBox 16">
-            <a:extLst>
-              <a:ext uri="{FF2B5EF4-FFF2-40B4-BE49-F238E27FC236}">
-                <a16:creationId xmlns:a16="http://schemas.microsoft.com/office/drawing/2014/main" id="{195405B6-3963-4589-BA90-2EB76593C921}"/>
-              </a:ext>
-            </a:extLst>
-          </p:cNvPr>
-          <p:cNvSpPr txBox="1"/>
-          <p:nvPr/>
-        </p:nvSpPr>
-        <p:spPr>
-          <a:xfrm>
-            <a:off x="2252353" y="2436421"/>
-            <a:ext cx="1947553" cy="298149"/>
-          </a:xfrm>
-          <a:prstGeom prst="rect">
-            <a:avLst/>
-          </a:prstGeom>
-          <a:noFill/>
-          <a:ln w="38100">
-            <a:solidFill>
-              <a:srgbClr val="FF0000"/>
-            </a:solidFill>
-          </a:ln>
-        </p:spPr>
-        <p:txBody>
-          <a:bodyPr wrap="square" rtlCol="0">
-            <a:spAutoFit/>
-          </a:bodyPr>
-          <a:lstStyle/>
-          <a:p>
-            <a:endParaRPr lang="en-US" dirty="0"/>
-          </a:p>
-        </p:txBody>
-      </p:sp>
-      <p:sp>
-        <p:nvSpPr>
-          <p:cNvPr id="18" name="TextBox 17">
-            <a:extLst>
-              <a:ext uri="{FF2B5EF4-FFF2-40B4-BE49-F238E27FC236}">
-                <a16:creationId xmlns:a16="http://schemas.microsoft.com/office/drawing/2014/main" id="{E8AE9FBD-946E-4CFE-9BB3-DF300E8A1803}"/>
-              </a:ext>
-            </a:extLst>
-          </p:cNvPr>
-          <p:cNvSpPr txBox="1"/>
-          <p:nvPr/>
-        </p:nvSpPr>
-        <p:spPr>
-          <a:xfrm>
-            <a:off x="2252353" y="798063"/>
-            <a:ext cx="1947553" cy="298149"/>
-          </a:xfrm>
-          <a:prstGeom prst="rect">
-            <a:avLst/>
-          </a:prstGeom>
-          <a:noFill/>
-          <a:ln w="38100">
-            <a:solidFill>
-              <a:srgbClr val="FF0000"/>
-            </a:solidFill>
-          </a:ln>
-        </p:spPr>
-        <p:txBody>
-          <a:bodyPr wrap="square" rtlCol="0">
-            <a:spAutoFit/>
-          </a:bodyPr>
-          <a:lstStyle/>
-          <a:p>
-            <a:endParaRPr lang="en-US" dirty="0"/>
-          </a:p>
-        </p:txBody>
-      </p:sp>
-      <p:sp>
-        <p:nvSpPr>
-          <p:cNvPr id="19" name="TextBox 18">
-            <a:extLst>
-              <a:ext uri="{FF2B5EF4-FFF2-40B4-BE49-F238E27FC236}">
-                <a16:creationId xmlns:a16="http://schemas.microsoft.com/office/drawing/2014/main" id="{68BD1286-4EAD-4046-886C-B3242A7ECCC5}"/>
-              </a:ext>
-            </a:extLst>
-          </p:cNvPr>
-          <p:cNvSpPr txBox="1"/>
-          <p:nvPr/>
-        </p:nvSpPr>
-        <p:spPr>
-          <a:xfrm>
-            <a:off x="53493" y="4079955"/>
-            <a:ext cx="2749191" cy="1200329"/>
-          </a:xfrm>
-          <a:prstGeom prst="rect">
-            <a:avLst/>
-          </a:prstGeom>
-          <a:noFill/>
-        </p:spPr>
-        <p:txBody>
-          <a:bodyPr wrap="square" rtlCol="0">
-            <a:spAutoFit/>
-          </a:bodyPr>
-          <a:lstStyle/>
-          <a:p>
-            <a:r>
-              <a:rPr lang="en-US" dirty="0"/>
-              <a:t>24d exposure results in significant </a:t>
-            </a:r>
-            <a:r>
-              <a:rPr lang="en-US" dirty="0" err="1"/>
-              <a:t>gsh</a:t>
-            </a:r>
-            <a:r>
-              <a:rPr lang="en-US" dirty="0"/>
-              <a:t> elevation (when outliers are dropped)</a:t>
+              <a:t>Snout-vent-length and body weight significantly related as, but not a big deal for treatment</a:t>
             </a:r>
           </a:p>
         </p:txBody>
@@ -5247,7 +5445,7 @@
     </p:spTree>
     <p:extLst>
       <p:ext uri="{BB962C8B-B14F-4D97-AF65-F5344CB8AC3E}">
-        <p14:creationId xmlns:p14="http://schemas.microsoft.com/office/powerpoint/2010/main" val="1444396804"/>
+        <p14:creationId xmlns:p14="http://schemas.microsoft.com/office/powerpoint/2010/main" val="1147033632"/>
       </p:ext>
     </p:extLst>
   </p:cSld>

</xml_diff>